<commit_message>
Add snapshot slides for quiz questions 6-8
</commit_message>
<xml_diff>
--- a/lectures/04_Mixed_Language_Programming_In_Ada/01_Mixed_Language_Programming_In_Ada/Slides/01_Mixed_Language_Programming_In_Ada.pptx
+++ b/lectures/04_Mixed_Language_Programming_In_Ada/01_Mixed_Language_Programming_In_Ada/Slides/01_Mixed_Language_Programming_In_Ada.pptx
@@ -229,7 +229,7 @@
           <a:p>
             <a:fld id="{6AEF8CB0-33D2-4F49-9A97-DB788DFC7082}" type="datetimeFigureOut">
               <a:rPr lang="en-GB" smtClean="0"/>
-              <a:t>10/08/2014</a:t>
+              <a:t>24/09/2017</a:t>
             </a:fld>
             <a:endParaRPr lang="en-GB"/>
           </a:p>
@@ -21161,6 +21161,36 @@
           </a:p>
         </p:txBody>
       </p:sp>
+      <p:pic>
+        <p:nvPicPr>
+          <p:cNvPr id="5" name="Image 4"/>
+          <p:cNvPicPr>
+            <a:picLocks noChangeAspect="1"/>
+          </p:cNvPicPr>
+          <p:nvPr/>
+        </p:nvPicPr>
+        <p:blipFill>
+          <a:blip r:embed="rId3">
+            <a:extLst>
+              <a:ext uri="{28A0092B-C50C-407E-A947-70E740481C1C}">
+                <a14:useLocalDpi xmlns:a14="http://schemas.microsoft.com/office/drawing/2010/main" val="0"/>
+              </a:ext>
+            </a:extLst>
+          </a:blip>
+          <a:stretch>
+            <a:fillRect/>
+          </a:stretch>
+        </p:blipFill>
+        <p:spPr>
+          <a:xfrm>
+            <a:off x="50800" y="63500"/>
+            <a:ext cx="9042400" cy="6731000"/>
+          </a:xfrm>
+          <a:prstGeom prst="rect">
+            <a:avLst/>
+          </a:prstGeom>
+        </p:spPr>
+      </p:pic>
     </p:spTree>
     <p:extLst>
       <p:ext uri="{BB962C8B-B14F-4D97-AF65-F5344CB8AC3E}">
@@ -21221,6 +21251,36 @@
           </a:p>
         </p:txBody>
       </p:sp>
+      <p:pic>
+        <p:nvPicPr>
+          <p:cNvPr id="4" name="Image 3"/>
+          <p:cNvPicPr>
+            <a:picLocks noChangeAspect="1"/>
+          </p:cNvPicPr>
+          <p:nvPr/>
+        </p:nvPicPr>
+        <p:blipFill>
+          <a:blip r:embed="rId3">
+            <a:extLst>
+              <a:ext uri="{28A0092B-C50C-407E-A947-70E740481C1C}">
+                <a14:useLocalDpi xmlns:a14="http://schemas.microsoft.com/office/drawing/2010/main" val="0"/>
+              </a:ext>
+            </a:extLst>
+          </a:blip>
+          <a:stretch>
+            <a:fillRect/>
+          </a:stretch>
+        </p:blipFill>
+        <p:spPr>
+          <a:xfrm>
+            <a:off x="63500" y="76200"/>
+            <a:ext cx="9017000" cy="6705600"/>
+          </a:xfrm>
+          <a:prstGeom prst="rect">
+            <a:avLst/>
+          </a:prstGeom>
+        </p:spPr>
+      </p:pic>
     </p:spTree>
     <p:extLst>
       <p:ext uri="{BB962C8B-B14F-4D97-AF65-F5344CB8AC3E}">
@@ -21281,6 +21341,36 @@
           </a:p>
         </p:txBody>
       </p:sp>
+      <p:pic>
+        <p:nvPicPr>
+          <p:cNvPr id="3" name="Image 2"/>
+          <p:cNvPicPr>
+            <a:picLocks noChangeAspect="1"/>
+          </p:cNvPicPr>
+          <p:nvPr/>
+        </p:nvPicPr>
+        <p:blipFill>
+          <a:blip r:embed="rId3">
+            <a:extLst>
+              <a:ext uri="{28A0092B-C50C-407E-A947-70E740481C1C}">
+                <a14:useLocalDpi xmlns:a14="http://schemas.microsoft.com/office/drawing/2010/main" val="0"/>
+              </a:ext>
+            </a:extLst>
+          </a:blip>
+          <a:stretch>
+            <a:fillRect/>
+          </a:stretch>
+        </p:blipFill>
+        <p:spPr>
+          <a:xfrm>
+            <a:off x="127000" y="101600"/>
+            <a:ext cx="8877300" cy="6642100"/>
+          </a:xfrm>
+          <a:prstGeom prst="rect">
+            <a:avLst/>
+          </a:prstGeom>
+        </p:spPr>
+      </p:pic>
     </p:spTree>
     <p:extLst>
       <p:ext uri="{BB962C8B-B14F-4D97-AF65-F5344CB8AC3E}">
@@ -21341,6 +21431,36 @@
           </a:p>
         </p:txBody>
       </p:sp>
+      <p:pic>
+        <p:nvPicPr>
+          <p:cNvPr id="4" name="Image 3"/>
+          <p:cNvPicPr>
+            <a:picLocks noChangeAspect="1"/>
+          </p:cNvPicPr>
+          <p:nvPr/>
+        </p:nvPicPr>
+        <p:blipFill>
+          <a:blip r:embed="rId3">
+            <a:extLst>
+              <a:ext uri="{28A0092B-C50C-407E-A947-70E740481C1C}">
+                <a14:useLocalDpi xmlns:a14="http://schemas.microsoft.com/office/drawing/2010/main" val="0"/>
+              </a:ext>
+            </a:extLst>
+          </a:blip>
+          <a:stretch>
+            <a:fillRect/>
+          </a:stretch>
+        </p:blipFill>
+        <p:spPr>
+          <a:xfrm>
+            <a:off x="76200" y="88900"/>
+            <a:ext cx="8991600" cy="6680200"/>
+          </a:xfrm>
+          <a:prstGeom prst="rect">
+            <a:avLst/>
+          </a:prstGeom>
+        </p:spPr>
+      </p:pic>
     </p:spTree>
     <p:extLst>
       <p:ext uri="{BB962C8B-B14F-4D97-AF65-F5344CB8AC3E}">
@@ -21401,6 +21521,36 @@
           </a:p>
         </p:txBody>
       </p:sp>
+      <p:pic>
+        <p:nvPicPr>
+          <p:cNvPr id="5" name="Image 4"/>
+          <p:cNvPicPr>
+            <a:picLocks noChangeAspect="1"/>
+          </p:cNvPicPr>
+          <p:nvPr/>
+        </p:nvPicPr>
+        <p:blipFill>
+          <a:blip r:embed="rId3">
+            <a:extLst>
+              <a:ext uri="{28A0092B-C50C-407E-A947-70E740481C1C}">
+                <a14:useLocalDpi xmlns:a14="http://schemas.microsoft.com/office/drawing/2010/main" val="0"/>
+              </a:ext>
+            </a:extLst>
+          </a:blip>
+          <a:stretch>
+            <a:fillRect/>
+          </a:stretch>
+        </p:blipFill>
+        <p:spPr>
+          <a:xfrm>
+            <a:off x="228600" y="228600"/>
+            <a:ext cx="8674100" cy="6388100"/>
+          </a:xfrm>
+          <a:prstGeom prst="rect">
+            <a:avLst/>
+          </a:prstGeom>
+        </p:spPr>
+      </p:pic>
     </p:spTree>
     <p:extLst>
       <p:ext uri="{BB962C8B-B14F-4D97-AF65-F5344CB8AC3E}">
@@ -21461,6 +21611,36 @@
           </a:p>
         </p:txBody>
       </p:sp>
+      <p:pic>
+        <p:nvPicPr>
+          <p:cNvPr id="4" name="Image 3"/>
+          <p:cNvPicPr>
+            <a:picLocks noChangeAspect="1"/>
+          </p:cNvPicPr>
+          <p:nvPr/>
+        </p:nvPicPr>
+        <p:blipFill>
+          <a:blip r:embed="rId3">
+            <a:extLst>
+              <a:ext uri="{28A0092B-C50C-407E-A947-70E740481C1C}">
+                <a14:useLocalDpi xmlns:a14="http://schemas.microsoft.com/office/drawing/2010/main" val="0"/>
+              </a:ext>
+            </a:extLst>
+          </a:blip>
+          <a:stretch>
+            <a:fillRect/>
+          </a:stretch>
+        </p:blipFill>
+        <p:spPr>
+          <a:xfrm>
+            <a:off x="127000" y="139700"/>
+            <a:ext cx="8877300" cy="6565900"/>
+          </a:xfrm>
+          <a:prstGeom prst="rect">
+            <a:avLst/>
+          </a:prstGeom>
+        </p:spPr>
+      </p:pic>
     </p:spTree>
     <p:extLst>
       <p:ext uri="{BB962C8B-B14F-4D97-AF65-F5344CB8AC3E}">

</xml_diff>